<commit_message>
Group member assignments added
</commit_message>
<xml_diff>
--- a/Presentations/9-15.pptx
+++ b/Presentations/9-15.pptx
@@ -516,7 +516,105 @@
           <a:p>
             <a:r>
               <a:rPr lang="en-US" dirty="0" smtClean="0"/>
-              <a:t>Peers like Matt Berger</a:t>
+              <a:t>Aston</a:t>
+            </a:r>
+            <a:endParaRPr lang="en-US" dirty="0"/>
+          </a:p>
+        </p:txBody>
+      </p:sp>
+      <p:sp>
+        <p:nvSpPr>
+          <p:cNvPr id="4" name="Slide Number Placeholder 3"/>
+          <p:cNvSpPr>
+            <a:spLocks noGrp="1"/>
+          </p:cNvSpPr>
+          <p:nvPr>
+            <p:ph type="sldNum" sz="quarter" idx="10"/>
+          </p:nvPr>
+        </p:nvSpPr>
+        <p:spPr/>
+        <p:txBody>
+          <a:bodyPr/>
+          <a:lstStyle/>
+          <a:p>
+            <a:fld id="{2F861C0B-6055-4D1D-8467-E1FE29F05220}" type="slidenum">
+              <a:rPr lang="en-US" smtClean="0"/>
+              <a:t>2</a:t>
+            </a:fld>
+            <a:endParaRPr lang="en-US"/>
+          </a:p>
+        </p:txBody>
+      </p:sp>
+    </p:spTree>
+    <p:extLst>
+      <p:ext uri="{BB962C8B-B14F-4D97-AF65-F5344CB8AC3E}">
+        <p14:creationId xmlns:p14="http://schemas.microsoft.com/office/powerpoint/2010/main" val="3384368449"/>
+      </p:ext>
+    </p:extLst>
+  </p:cSld>
+  <p:clrMapOvr>
+    <a:masterClrMapping/>
+  </p:clrMapOvr>
+</p:notes>
+</file>
+
+<file path=ppt/notesSlides/notesSlide2.xml><?xml version="1.0" encoding="utf-8"?>
+<p:notes xmlns:a="http://schemas.openxmlformats.org/drawingml/2006/main" xmlns:r="http://schemas.openxmlformats.org/officeDocument/2006/relationships" xmlns:p="http://schemas.openxmlformats.org/presentationml/2006/main">
+  <p:cSld>
+    <p:spTree>
+      <p:nvGrpSpPr>
+        <p:cNvPr id="1" name=""/>
+        <p:cNvGrpSpPr/>
+        <p:nvPr/>
+      </p:nvGrpSpPr>
+      <p:grpSpPr>
+        <a:xfrm>
+          <a:off x="0" y="0"/>
+          <a:ext cx="0" cy="0"/>
+          <a:chOff x="0" y="0"/>
+          <a:chExt cx="0" cy="0"/>
+        </a:xfrm>
+      </p:grpSpPr>
+      <p:sp>
+        <p:nvSpPr>
+          <p:cNvPr id="2" name="Slide Image Placeholder 1"/>
+          <p:cNvSpPr>
+            <a:spLocks noGrp="1" noRot="1" noChangeAspect="1"/>
+          </p:cNvSpPr>
+          <p:nvPr>
+            <p:ph type="sldImg"/>
+          </p:nvPr>
+        </p:nvSpPr>
+        <p:spPr/>
+      </p:sp>
+      <p:sp>
+        <p:nvSpPr>
+          <p:cNvPr id="3" name="Notes Placeholder 2"/>
+          <p:cNvSpPr>
+            <a:spLocks noGrp="1"/>
+          </p:cNvSpPr>
+          <p:nvPr>
+            <p:ph type="body" idx="1"/>
+          </p:nvPr>
+        </p:nvSpPr>
+        <p:spPr/>
+        <p:txBody>
+          <a:bodyPr/>
+          <a:lstStyle/>
+          <a:p>
+            <a:r>
+              <a:rPr lang="en-US" dirty="0" smtClean="0"/>
+              <a:t>Peers like Matt </a:t>
+            </a:r>
+            <a:r>
+              <a:rPr lang="en-US" dirty="0" smtClean="0"/>
+              <a:t>Berger</a:t>
+            </a:r>
+          </a:p>
+          <a:p>
+            <a:r>
+              <a:rPr lang="en-US" dirty="0" err="1" smtClean="0"/>
+              <a:t>Narith</a:t>
             </a:r>
             <a:endParaRPr lang="en-US" dirty="0"/>
           </a:p>
@@ -549,6 +647,270 @@
     <p:extLst>
       <p:ext uri="{BB962C8B-B14F-4D97-AF65-F5344CB8AC3E}">
         <p14:creationId xmlns:p14="http://schemas.microsoft.com/office/powerpoint/2010/main" val="4140003069"/>
+      </p:ext>
+    </p:extLst>
+  </p:cSld>
+  <p:clrMapOvr>
+    <a:masterClrMapping/>
+  </p:clrMapOvr>
+</p:notes>
+</file>
+
+<file path=ppt/notesSlides/notesSlide3.xml><?xml version="1.0" encoding="utf-8"?>
+<p:notes xmlns:a="http://schemas.openxmlformats.org/drawingml/2006/main" xmlns:r="http://schemas.openxmlformats.org/officeDocument/2006/relationships" xmlns:p="http://schemas.openxmlformats.org/presentationml/2006/main">
+  <p:cSld>
+    <p:spTree>
+      <p:nvGrpSpPr>
+        <p:cNvPr id="1" name=""/>
+        <p:cNvGrpSpPr/>
+        <p:nvPr/>
+      </p:nvGrpSpPr>
+      <p:grpSpPr>
+        <a:xfrm>
+          <a:off x="0" y="0"/>
+          <a:ext cx="0" cy="0"/>
+          <a:chOff x="0" y="0"/>
+          <a:chExt cx="0" cy="0"/>
+        </a:xfrm>
+      </p:grpSpPr>
+      <p:sp>
+        <p:nvSpPr>
+          <p:cNvPr id="2" name="Slide Image Placeholder 1"/>
+          <p:cNvSpPr>
+            <a:spLocks noGrp="1" noRot="1" noChangeAspect="1"/>
+          </p:cNvSpPr>
+          <p:nvPr>
+            <p:ph type="sldImg"/>
+          </p:nvPr>
+        </p:nvSpPr>
+        <p:spPr/>
+      </p:sp>
+      <p:sp>
+        <p:nvSpPr>
+          <p:cNvPr id="3" name="Notes Placeholder 2"/>
+          <p:cNvSpPr>
+            <a:spLocks noGrp="1"/>
+          </p:cNvSpPr>
+          <p:nvPr>
+            <p:ph type="body" idx="1"/>
+          </p:nvPr>
+        </p:nvSpPr>
+        <p:spPr/>
+        <p:txBody>
+          <a:bodyPr/>
+          <a:lstStyle/>
+          <a:p>
+            <a:r>
+              <a:rPr lang="en-US" dirty="0" smtClean="0"/>
+              <a:t>Aston</a:t>
+            </a:r>
+            <a:endParaRPr lang="en-US" dirty="0"/>
+          </a:p>
+        </p:txBody>
+      </p:sp>
+      <p:sp>
+        <p:nvSpPr>
+          <p:cNvPr id="4" name="Slide Number Placeholder 3"/>
+          <p:cNvSpPr>
+            <a:spLocks noGrp="1"/>
+          </p:cNvSpPr>
+          <p:nvPr>
+            <p:ph type="sldNum" sz="quarter" idx="10"/>
+          </p:nvPr>
+        </p:nvSpPr>
+        <p:spPr/>
+        <p:txBody>
+          <a:bodyPr/>
+          <a:lstStyle/>
+          <a:p>
+            <a:fld id="{2F861C0B-6055-4D1D-8467-E1FE29F05220}" type="slidenum">
+              <a:rPr lang="en-US" smtClean="0"/>
+              <a:t>4</a:t>
+            </a:fld>
+            <a:endParaRPr lang="en-US"/>
+          </a:p>
+        </p:txBody>
+      </p:sp>
+    </p:spTree>
+    <p:extLst>
+      <p:ext uri="{BB962C8B-B14F-4D97-AF65-F5344CB8AC3E}">
+        <p14:creationId xmlns:p14="http://schemas.microsoft.com/office/powerpoint/2010/main" val="796716028"/>
+      </p:ext>
+    </p:extLst>
+  </p:cSld>
+  <p:clrMapOvr>
+    <a:masterClrMapping/>
+  </p:clrMapOvr>
+</p:notes>
+</file>
+
+<file path=ppt/notesSlides/notesSlide4.xml><?xml version="1.0" encoding="utf-8"?>
+<p:notes xmlns:a="http://schemas.openxmlformats.org/drawingml/2006/main" xmlns:r="http://schemas.openxmlformats.org/officeDocument/2006/relationships" xmlns:p="http://schemas.openxmlformats.org/presentationml/2006/main">
+  <p:cSld>
+    <p:spTree>
+      <p:nvGrpSpPr>
+        <p:cNvPr id="1" name=""/>
+        <p:cNvGrpSpPr/>
+        <p:nvPr/>
+      </p:nvGrpSpPr>
+      <p:grpSpPr>
+        <a:xfrm>
+          <a:off x="0" y="0"/>
+          <a:ext cx="0" cy="0"/>
+          <a:chOff x="0" y="0"/>
+          <a:chExt cx="0" cy="0"/>
+        </a:xfrm>
+      </p:grpSpPr>
+      <p:sp>
+        <p:nvSpPr>
+          <p:cNvPr id="2" name="Slide Image Placeholder 1"/>
+          <p:cNvSpPr>
+            <a:spLocks noGrp="1" noRot="1" noChangeAspect="1"/>
+          </p:cNvSpPr>
+          <p:nvPr>
+            <p:ph type="sldImg"/>
+          </p:nvPr>
+        </p:nvSpPr>
+        <p:spPr/>
+      </p:sp>
+      <p:sp>
+        <p:nvSpPr>
+          <p:cNvPr id="3" name="Notes Placeholder 2"/>
+          <p:cNvSpPr>
+            <a:spLocks noGrp="1"/>
+          </p:cNvSpPr>
+          <p:nvPr>
+            <p:ph type="body" idx="1"/>
+          </p:nvPr>
+        </p:nvSpPr>
+        <p:spPr/>
+        <p:txBody>
+          <a:bodyPr/>
+          <a:lstStyle/>
+          <a:p>
+            <a:r>
+              <a:rPr lang="en-US" dirty="0" smtClean="0"/>
+              <a:t>Mike</a:t>
+            </a:r>
+            <a:endParaRPr lang="en-US" dirty="0"/>
+          </a:p>
+        </p:txBody>
+      </p:sp>
+      <p:sp>
+        <p:nvSpPr>
+          <p:cNvPr id="4" name="Slide Number Placeholder 3"/>
+          <p:cNvSpPr>
+            <a:spLocks noGrp="1"/>
+          </p:cNvSpPr>
+          <p:nvPr>
+            <p:ph type="sldNum" sz="quarter" idx="10"/>
+          </p:nvPr>
+        </p:nvSpPr>
+        <p:spPr/>
+        <p:txBody>
+          <a:bodyPr/>
+          <a:lstStyle/>
+          <a:p>
+            <a:fld id="{2F861C0B-6055-4D1D-8467-E1FE29F05220}" type="slidenum">
+              <a:rPr lang="en-US" smtClean="0"/>
+              <a:t>5</a:t>
+            </a:fld>
+            <a:endParaRPr lang="en-US"/>
+          </a:p>
+        </p:txBody>
+      </p:sp>
+    </p:spTree>
+    <p:extLst>
+      <p:ext uri="{BB962C8B-B14F-4D97-AF65-F5344CB8AC3E}">
+        <p14:creationId xmlns:p14="http://schemas.microsoft.com/office/powerpoint/2010/main" val="2662228312"/>
+      </p:ext>
+    </p:extLst>
+  </p:cSld>
+  <p:clrMapOvr>
+    <a:masterClrMapping/>
+  </p:clrMapOvr>
+</p:notes>
+</file>
+
+<file path=ppt/notesSlides/notesSlide5.xml><?xml version="1.0" encoding="utf-8"?>
+<p:notes xmlns:a="http://schemas.openxmlformats.org/drawingml/2006/main" xmlns:r="http://schemas.openxmlformats.org/officeDocument/2006/relationships" xmlns:p="http://schemas.openxmlformats.org/presentationml/2006/main">
+  <p:cSld>
+    <p:spTree>
+      <p:nvGrpSpPr>
+        <p:cNvPr id="1" name=""/>
+        <p:cNvGrpSpPr/>
+        <p:nvPr/>
+      </p:nvGrpSpPr>
+      <p:grpSpPr>
+        <a:xfrm>
+          <a:off x="0" y="0"/>
+          <a:ext cx="0" cy="0"/>
+          <a:chOff x="0" y="0"/>
+          <a:chExt cx="0" cy="0"/>
+        </a:xfrm>
+      </p:grpSpPr>
+      <p:sp>
+        <p:nvSpPr>
+          <p:cNvPr id="2" name="Slide Image Placeholder 1"/>
+          <p:cNvSpPr>
+            <a:spLocks noGrp="1" noRot="1" noChangeAspect="1"/>
+          </p:cNvSpPr>
+          <p:nvPr>
+            <p:ph type="sldImg"/>
+          </p:nvPr>
+        </p:nvSpPr>
+        <p:spPr/>
+      </p:sp>
+      <p:sp>
+        <p:nvSpPr>
+          <p:cNvPr id="3" name="Notes Placeholder 2"/>
+          <p:cNvSpPr>
+            <a:spLocks noGrp="1"/>
+          </p:cNvSpPr>
+          <p:nvPr>
+            <p:ph type="body" idx="1"/>
+          </p:nvPr>
+        </p:nvSpPr>
+        <p:spPr/>
+        <p:txBody>
+          <a:bodyPr/>
+          <a:lstStyle/>
+          <a:p>
+            <a:r>
+              <a:rPr lang="en-US" smtClean="0"/>
+              <a:t>Narith</a:t>
+            </a:r>
+            <a:endParaRPr lang="en-US"/>
+          </a:p>
+        </p:txBody>
+      </p:sp>
+      <p:sp>
+        <p:nvSpPr>
+          <p:cNvPr id="4" name="Slide Number Placeholder 3"/>
+          <p:cNvSpPr>
+            <a:spLocks noGrp="1"/>
+          </p:cNvSpPr>
+          <p:nvPr>
+            <p:ph type="sldNum" sz="quarter" idx="10"/>
+          </p:nvPr>
+        </p:nvSpPr>
+        <p:spPr/>
+        <p:txBody>
+          <a:bodyPr/>
+          <a:lstStyle/>
+          <a:p>
+            <a:fld id="{2F861C0B-6055-4D1D-8467-E1FE29F05220}" type="slidenum">
+              <a:rPr lang="en-US" smtClean="0"/>
+              <a:t>6</a:t>
+            </a:fld>
+            <a:endParaRPr lang="en-US"/>
+          </a:p>
+        </p:txBody>
+      </p:sp>
+    </p:spTree>
+    <p:extLst>
+      <p:ext uri="{BB962C8B-B14F-4D97-AF65-F5344CB8AC3E}">
+        <p14:creationId xmlns:p14="http://schemas.microsoft.com/office/powerpoint/2010/main" val="1656841716"/>
       </p:ext>
     </p:extLst>
   </p:cSld>
@@ -6410,7 +6772,7 @@
           <p:nvPr/>
         </p:nvPicPr>
         <p:blipFill>
-          <a:blip r:embed="rId2">
+          <a:blip r:embed="rId3">
             <a:extLst>
               <a:ext uri="{28A0092B-C50C-407E-A947-70E740481C1C}">
                 <a14:useLocalDpi xmlns:a14="http://schemas.microsoft.com/office/drawing/2010/main" val="0"/>

</xml_diff>

<commit_message>
Add process tool and repo tool
</commit_message>
<xml_diff>
--- a/Presentations/9-15.pptx
+++ b/Presentations/9-15.pptx
@@ -202,7 +202,7 @@
           <a:p>
             <a:fld id="{3C7BD74C-943D-4FED-8AD0-C0754866720F}" type="datetimeFigureOut">
               <a:rPr lang="en-US" smtClean="0"/>
-              <a:t>9/14/2016</a:t>
+              <a:t>9/15/2016</a:t>
             </a:fld>
             <a:endParaRPr lang="en-US"/>
           </a:p>
@@ -604,11 +604,7 @@
           <a:p>
             <a:r>
               <a:rPr lang="en-US" dirty="0" smtClean="0"/>
-              <a:t>Peers like Matt </a:t>
-            </a:r>
-            <a:r>
-              <a:rPr lang="en-US" dirty="0" smtClean="0"/>
-              <a:t>Berger</a:t>
+              <a:t>Peers like Matt Berger</a:t>
             </a:r>
           </a:p>
           <a:p>
@@ -1642,7 +1638,7 @@
           <a:p>
             <a:fld id="{45A43BFB-40E5-4CCE-B8FE-8AD372A246B8}" type="datetimeFigureOut">
               <a:rPr lang="en-US" smtClean="0"/>
-              <a:t>9/14/2016</a:t>
+              <a:t>9/15/2016</a:t>
             </a:fld>
             <a:endParaRPr lang="en-US"/>
           </a:p>
@@ -1893,7 +1889,7 @@
           <a:p>
             <a:fld id="{45A43BFB-40E5-4CCE-B8FE-8AD372A246B8}" type="datetimeFigureOut">
               <a:rPr lang="en-US" smtClean="0"/>
-              <a:t>9/14/2016</a:t>
+              <a:t>9/15/2016</a:t>
             </a:fld>
             <a:endParaRPr lang="en-US"/>
           </a:p>
@@ -2207,7 +2203,7 @@
           <a:p>
             <a:fld id="{45A43BFB-40E5-4CCE-B8FE-8AD372A246B8}" type="datetimeFigureOut">
               <a:rPr lang="en-US" smtClean="0"/>
-              <a:t>9/14/2016</a:t>
+              <a:t>9/15/2016</a:t>
             </a:fld>
             <a:endParaRPr lang="en-US"/>
           </a:p>
@@ -2548,7 +2544,7 @@
           <a:p>
             <a:fld id="{45A43BFB-40E5-4CCE-B8FE-8AD372A246B8}" type="datetimeFigureOut">
               <a:rPr lang="en-US" smtClean="0"/>
-              <a:t>9/14/2016</a:t>
+              <a:t>9/15/2016</a:t>
             </a:fld>
             <a:endParaRPr lang="en-US"/>
           </a:p>
@@ -2862,7 +2858,7 @@
           <a:p>
             <a:fld id="{45A43BFB-40E5-4CCE-B8FE-8AD372A246B8}" type="datetimeFigureOut">
               <a:rPr lang="en-US" smtClean="0"/>
-              <a:t>9/14/2016</a:t>
+              <a:t>9/15/2016</a:t>
             </a:fld>
             <a:endParaRPr lang="en-US"/>
           </a:p>
@@ -3255,7 +3251,7 @@
           <a:p>
             <a:fld id="{45A43BFB-40E5-4CCE-B8FE-8AD372A246B8}" type="datetimeFigureOut">
               <a:rPr lang="en-US" smtClean="0"/>
-              <a:t>9/14/2016</a:t>
+              <a:t>9/15/2016</a:t>
             </a:fld>
             <a:endParaRPr lang="en-US"/>
           </a:p>
@@ -3425,7 +3421,7 @@
           <a:p>
             <a:fld id="{45A43BFB-40E5-4CCE-B8FE-8AD372A246B8}" type="datetimeFigureOut">
               <a:rPr lang="en-US" smtClean="0"/>
-              <a:t>9/14/2016</a:t>
+              <a:t>9/15/2016</a:t>
             </a:fld>
             <a:endParaRPr lang="en-US"/>
           </a:p>
@@ -3605,7 +3601,7 @@
           <a:p>
             <a:fld id="{45A43BFB-40E5-4CCE-B8FE-8AD372A246B8}" type="datetimeFigureOut">
               <a:rPr lang="en-US" smtClean="0"/>
-              <a:t>9/14/2016</a:t>
+              <a:t>9/15/2016</a:t>
             </a:fld>
             <a:endParaRPr lang="en-US"/>
           </a:p>
@@ -3781,7 +3777,7 @@
           <a:p>
             <a:fld id="{45A43BFB-40E5-4CCE-B8FE-8AD372A246B8}" type="datetimeFigureOut">
               <a:rPr lang="en-US" smtClean="0"/>
-              <a:t>9/14/2016</a:t>
+              <a:t>9/15/2016</a:t>
             </a:fld>
             <a:endParaRPr lang="en-US"/>
           </a:p>
@@ -4028,7 +4024,7 @@
           <a:p>
             <a:fld id="{45A43BFB-40E5-4CCE-B8FE-8AD372A246B8}" type="datetimeFigureOut">
               <a:rPr lang="en-US" smtClean="0"/>
-              <a:t>9/14/2016</a:t>
+              <a:t>9/15/2016</a:t>
             </a:fld>
             <a:endParaRPr lang="en-US"/>
           </a:p>
@@ -4260,7 +4256,7 @@
           <a:p>
             <a:fld id="{45A43BFB-40E5-4CCE-B8FE-8AD372A246B8}" type="datetimeFigureOut">
               <a:rPr lang="en-US" smtClean="0"/>
-              <a:t>9/14/2016</a:t>
+              <a:t>9/15/2016</a:t>
             </a:fld>
             <a:endParaRPr lang="en-US"/>
           </a:p>
@@ -4634,7 +4630,7 @@
           <a:p>
             <a:fld id="{45A43BFB-40E5-4CCE-B8FE-8AD372A246B8}" type="datetimeFigureOut">
               <a:rPr lang="en-US" smtClean="0"/>
-              <a:t>9/14/2016</a:t>
+              <a:t>9/15/2016</a:t>
             </a:fld>
             <a:endParaRPr lang="en-US"/>
           </a:p>
@@ -4757,7 +4753,7 @@
           <a:p>
             <a:fld id="{45A43BFB-40E5-4CCE-B8FE-8AD372A246B8}" type="datetimeFigureOut">
               <a:rPr lang="en-US" smtClean="0"/>
-              <a:t>9/14/2016</a:t>
+              <a:t>9/15/2016</a:t>
             </a:fld>
             <a:endParaRPr lang="en-US"/>
           </a:p>
@@ -4852,7 +4848,7 @@
           <a:p>
             <a:fld id="{45A43BFB-40E5-4CCE-B8FE-8AD372A246B8}" type="datetimeFigureOut">
               <a:rPr lang="en-US" smtClean="0"/>
-              <a:t>9/14/2016</a:t>
+              <a:t>9/15/2016</a:t>
             </a:fld>
             <a:endParaRPr lang="en-US"/>
           </a:p>
@@ -5107,7 +5103,7 @@
           <a:p>
             <a:fld id="{45A43BFB-40E5-4CCE-B8FE-8AD372A246B8}" type="datetimeFigureOut">
               <a:rPr lang="en-US" smtClean="0"/>
-              <a:t>9/14/2016</a:t>
+              <a:t>9/15/2016</a:t>
             </a:fld>
             <a:endParaRPr lang="en-US"/>
           </a:p>
@@ -5370,7 +5366,7 @@
           <a:p>
             <a:fld id="{45A43BFB-40E5-4CCE-B8FE-8AD372A246B8}" type="datetimeFigureOut">
               <a:rPr lang="en-US" smtClean="0"/>
-              <a:t>9/14/2016</a:t>
+              <a:t>9/15/2016</a:t>
             </a:fld>
             <a:endParaRPr lang="en-US"/>
           </a:p>
@@ -6113,7 +6109,7 @@
           <a:p>
             <a:fld id="{45A43BFB-40E5-4CCE-B8FE-8AD372A246B8}" type="datetimeFigureOut">
               <a:rPr lang="en-US" smtClean="0"/>
-              <a:t>9/14/2016</a:t>
+              <a:t>9/15/2016</a:t>
             </a:fld>
             <a:endParaRPr lang="en-US"/>
           </a:p>
@@ -6982,6 +6978,34 @@
             </a:r>
           </a:p>
           <a:p>
+            <a:pPr marL="0" indent="0">
+              <a:buNone/>
+            </a:pPr>
+            <a:r>
+              <a:rPr lang="en-US" dirty="0" smtClean="0"/>
+              <a:t>Project Tool</a:t>
+            </a:r>
+          </a:p>
+          <a:p>
+            <a:r>
+              <a:rPr lang="en-US" dirty="0" smtClean="0"/>
+              <a:t>Version One</a:t>
+            </a:r>
+          </a:p>
+          <a:p>
+            <a:pPr marL="0" indent="0">
+              <a:buNone/>
+            </a:pPr>
+            <a:r>
+              <a:rPr lang="en-US" dirty="0" smtClean="0"/>
+              <a:t>Repository Tool</a:t>
+            </a:r>
+          </a:p>
+          <a:p>
+            <a:r>
+              <a:rPr lang="en-US" smtClean="0"/>
+              <a:t>GitHub</a:t>
+            </a:r>
             <a:endParaRPr lang="en-US" dirty="0" smtClean="0"/>
           </a:p>
           <a:p>

</xml_diff>